<commit_message>
change: se cambia pptx (letra)
</commit_message>
<xml_diff>
--- a/001.pptx
+++ b/001.pptx
@@ -123,7 +123,7 @@
   </p:defaultTextStyle>
   <p:extLst>
     <p:ext uri="{EFAFB233-063F-42B5-8137-9DF3F51BA10A}">
-      <p15:sldGuideLst xmlns:p15="http://schemas.microsoft.com/office/powerpoint/2012/main" xmlns="">
+      <p15:sldGuideLst xmlns="" xmlns:p15="http://schemas.microsoft.com/office/powerpoint/2012/main">
         <p15:guide id="1" orient="horz" pos="2160">
           <p15:clr>
             <a:srgbClr val="A4A3A4"/>
@@ -223,7 +223,7 @@
             <a:fld id="{0BB87D87-4908-4472-B30F-F94DEDE6C013}" type="datetimeFigureOut">
               <a:rPr lang="es-CL" smtClean="0"/>
               <a:pPr/>
-              <a:t>09-05-2018</a:t>
+              <a:t>19-05-2018</a:t>
             </a:fld>
             <a:endParaRPr lang="es-CL" dirty="0"/>
           </a:p>
@@ -2027,7 +2027,7 @@
               <a:pPr>
                 <a:defRPr/>
               </a:pPr>
-              <a:t>09-05-2018</a:t>
+              <a:t>19-05-2018</a:t>
             </a:fld>
             <a:endParaRPr lang="es-ES" dirty="0">
               <a:solidFill>
@@ -2272,7 +2272,7 @@
               <a:pPr>
                 <a:defRPr/>
               </a:pPr>
-              <a:t>09-05-2018</a:t>
+              <a:t>19-05-2018</a:t>
             </a:fld>
             <a:endParaRPr lang="es-ES" dirty="0">
               <a:solidFill>
@@ -2497,7 +2497,7 @@
               <a:pPr>
                 <a:defRPr/>
               </a:pPr>
-              <a:t>09-05-2018</a:t>
+              <a:t>19-05-2018</a:t>
             </a:fld>
             <a:endParaRPr lang="es-ES" dirty="0">
               <a:solidFill>
@@ -2712,7 +2712,7 @@
               <a:pPr>
                 <a:defRPr/>
               </a:pPr>
-              <a:t>09-05-2018</a:t>
+              <a:t>19-05-2018</a:t>
             </a:fld>
             <a:endParaRPr lang="es-ES" dirty="0">
               <a:solidFill>
@@ -3033,7 +3033,7 @@
               <a:pPr>
                 <a:defRPr/>
               </a:pPr>
-              <a:t>09-05-2018</a:t>
+              <a:t>19-05-2018</a:t>
             </a:fld>
             <a:endParaRPr lang="es-ES" dirty="0">
               <a:solidFill>
@@ -3396,7 +3396,7 @@
               <a:pPr>
                 <a:defRPr/>
               </a:pPr>
-              <a:t>09-05-2018</a:t>
+              <a:t>19-05-2018</a:t>
             </a:fld>
             <a:endParaRPr lang="es-ES" dirty="0">
               <a:solidFill>
@@ -3863,7 +3863,7 @@
               <a:pPr>
                 <a:defRPr/>
               </a:pPr>
-              <a:t>09-05-2018</a:t>
+              <a:t>19-05-2018</a:t>
             </a:fld>
             <a:endParaRPr lang="es-ES" dirty="0">
               <a:solidFill>
@@ -4026,7 +4026,7 @@
               <a:pPr>
                 <a:defRPr/>
               </a:pPr>
-              <a:t>09-05-2018</a:t>
+              <a:t>19-05-2018</a:t>
             </a:fld>
             <a:endParaRPr lang="es-ES" dirty="0">
               <a:solidFill>
@@ -4166,7 +4166,7 @@
               <a:pPr>
                 <a:defRPr/>
               </a:pPr>
-              <a:t>09-05-2018</a:t>
+              <a:t>19-05-2018</a:t>
             </a:fld>
             <a:endParaRPr lang="es-ES" dirty="0">
               <a:solidFill>
@@ -4488,7 +4488,7 @@
               <a:pPr>
                 <a:defRPr/>
               </a:pPr>
-              <a:t>09-05-2018</a:t>
+              <a:t>19-05-2018</a:t>
             </a:fld>
             <a:endParaRPr lang="es-ES" dirty="0">
               <a:solidFill>
@@ -4786,7 +4786,7 @@
               <a:pPr>
                 <a:defRPr/>
               </a:pPr>
-              <a:t>09-05-2018</a:t>
+              <a:t>19-05-2018</a:t>
             </a:fld>
             <a:endParaRPr lang="es-ES" dirty="0">
               <a:solidFill>
@@ -5056,7 +5056,7 @@
                 </a:spcAft>
                 <a:defRPr/>
               </a:pPr>
-              <a:t>09-05-2018</a:t>
+              <a:t>19-05-2018</a:t>
             </a:fld>
             <a:endParaRPr lang="es-ES" dirty="0">
               <a:solidFill>
@@ -5753,7 +5753,7 @@
           <p:cNvPr id="5" name="Imagen 4">
             <a:extLst>
               <a:ext uri="{FF2B5EF4-FFF2-40B4-BE49-F238E27FC236}">
-                <a16:creationId xmlns:a16="http://schemas.microsoft.com/office/drawing/2014/main" xmlns="" id="{108CDE6D-5A82-4474-9D0B-D6F0ADC91ED6}"/>
+                <a16:creationId xmlns="" xmlns:a16="http://schemas.microsoft.com/office/drawing/2014/main" id="{108CDE6D-5A82-4474-9D0B-D6F0ADC91ED6}"/>
               </a:ext>
             </a:extLst>
           </p:cNvPr>
@@ -5783,7 +5783,7 @@
           <p:cNvPr id="6" name="Imagen 5">
             <a:extLst>
               <a:ext uri="{FF2B5EF4-FFF2-40B4-BE49-F238E27FC236}">
-                <a16:creationId xmlns:a16="http://schemas.microsoft.com/office/drawing/2014/main" xmlns="" id="{9D180748-6181-48E9-84CB-169245AE060E}"/>
+                <a16:creationId xmlns="" xmlns:a16="http://schemas.microsoft.com/office/drawing/2014/main" id="{9D180748-6181-48E9-84CB-169245AE060E}"/>
               </a:ext>
             </a:extLst>
           </p:cNvPr>
@@ -5924,7 +5924,7 @@
           <p:cNvPr id="3" name="Imagen 2">
             <a:extLst>
               <a:ext uri="{FF2B5EF4-FFF2-40B4-BE49-F238E27FC236}">
-                <a16:creationId xmlns:a16="http://schemas.microsoft.com/office/drawing/2014/main" xmlns="" id="{C288EE2C-BB66-450F-8E66-6EC642255789}"/>
+                <a16:creationId xmlns="" xmlns:a16="http://schemas.microsoft.com/office/drawing/2014/main" id="{C288EE2C-BB66-450F-8E66-6EC642255789}"/>
               </a:ext>
             </a:extLst>
           </p:cNvPr>
@@ -5954,7 +5954,7 @@
           <p:cNvPr id="7" name="Imagen 6">
             <a:extLst>
               <a:ext uri="{FF2B5EF4-FFF2-40B4-BE49-F238E27FC236}">
-                <a16:creationId xmlns:a16="http://schemas.microsoft.com/office/drawing/2014/main" xmlns="" id="{9FA2571D-B6C4-4919-BCD5-8F46A8983CBE}"/>
+                <a16:creationId xmlns="" xmlns:a16="http://schemas.microsoft.com/office/drawing/2014/main" id="{9FA2571D-B6C4-4919-BCD5-8F46A8983CBE}"/>
               </a:ext>
             </a:extLst>
           </p:cNvPr>
@@ -6156,7 +6156,7 @@
           <p:cNvPr id="5" name="Imagen 4">
             <a:extLst>
               <a:ext uri="{FF2B5EF4-FFF2-40B4-BE49-F238E27FC236}">
-                <a16:creationId xmlns:a16="http://schemas.microsoft.com/office/drawing/2014/main" xmlns="" id="{4D9C16AF-6470-4D54-9DC3-5802FC08C387}"/>
+                <a16:creationId xmlns="" xmlns:a16="http://schemas.microsoft.com/office/drawing/2014/main" id="{4D9C16AF-6470-4D54-9DC3-5802FC08C387}"/>
               </a:ext>
             </a:extLst>
           </p:cNvPr>
@@ -6186,7 +6186,7 @@
           <p:cNvPr id="6" name="Imagen 5">
             <a:extLst>
               <a:ext uri="{FF2B5EF4-FFF2-40B4-BE49-F238E27FC236}">
-                <a16:creationId xmlns:a16="http://schemas.microsoft.com/office/drawing/2014/main" xmlns="" id="{D5D47119-F0C0-426A-BFF9-08B2BAAE85FF}"/>
+                <a16:creationId xmlns="" xmlns:a16="http://schemas.microsoft.com/office/drawing/2014/main" id="{D5D47119-F0C0-426A-BFF9-08B2BAAE85FF}"/>
               </a:ext>
             </a:extLst>
           </p:cNvPr>
@@ -6221,11 +6221,11 @@
   <p:clrMapOvr>
     <a:masterClrMapping/>
   </p:clrMapOvr>
-  <mc:AlternateContent xmlns:mc="http://schemas.openxmlformats.org/markup-compatibility/2006">
-    <mc:Choice xmlns:p14="http://schemas.microsoft.com/office/powerpoint/2010/main" Requires="p14">
+  <mc:AlternateContent xmlns:mc="http://schemas.openxmlformats.org/markup-compatibility/2006" xmlns:p14="http://schemas.microsoft.com/office/powerpoint/2010/main">
+    <mc:Choice Requires="p14">
       <p:transition spd="slow" p14:dur="2000"/>
     </mc:Choice>
-    <mc:Fallback>
+    <mc:Fallback xmlns="">
       <p:transition spd="slow"/>
     </mc:Fallback>
   </mc:AlternateContent>
@@ -6335,7 +6335,7 @@
           <p:cNvPr id="8" name="CuadroTexto 7">
             <a:extLst>
               <a:ext uri="{FF2B5EF4-FFF2-40B4-BE49-F238E27FC236}">
-                <a16:creationId xmlns:a16="http://schemas.microsoft.com/office/drawing/2014/main" xmlns="" id="{A7CE5B43-B93F-4E5C-A6C5-E4CE53DF3C30}"/>
+                <a16:creationId xmlns="" xmlns:a16="http://schemas.microsoft.com/office/drawing/2014/main" id="{A7CE5B43-B93F-4E5C-A6C5-E4CE53DF3C30}"/>
               </a:ext>
             </a:extLst>
           </p:cNvPr>
@@ -6392,11 +6392,11 @@
   <p:clrMapOvr>
     <a:masterClrMapping/>
   </p:clrMapOvr>
-  <mc:AlternateContent xmlns:mc="http://schemas.openxmlformats.org/markup-compatibility/2006">
-    <mc:Choice xmlns:p14="http://schemas.microsoft.com/office/powerpoint/2010/main" Requires="p14">
+  <mc:AlternateContent xmlns:mc="http://schemas.openxmlformats.org/markup-compatibility/2006" xmlns:p14="http://schemas.microsoft.com/office/powerpoint/2010/main">
+    <mc:Choice Requires="p14">
       <p:transition spd="slow" p14:dur="2000"/>
     </mc:Choice>
-    <mc:Fallback>
+    <mc:Fallback xmlns="">
       <p:transition spd="slow"/>
     </mc:Fallback>
   </mc:AlternateContent>
@@ -6506,7 +6506,7 @@
           <p:cNvPr id="3" name="Imagen 2">
             <a:extLst>
               <a:ext uri="{FF2B5EF4-FFF2-40B4-BE49-F238E27FC236}">
-                <a16:creationId xmlns:a16="http://schemas.microsoft.com/office/drawing/2014/main" xmlns="" id="{4B1F2B1E-2217-4F87-BEBA-884957365684}"/>
+                <a16:creationId xmlns="" xmlns:a16="http://schemas.microsoft.com/office/drawing/2014/main" id="{4B1F2B1E-2217-4F87-BEBA-884957365684}"/>
               </a:ext>
             </a:extLst>
           </p:cNvPr>
@@ -6536,7 +6536,7 @@
           <p:cNvPr id="7" name="Imagen 6">
             <a:extLst>
               <a:ext uri="{FF2B5EF4-FFF2-40B4-BE49-F238E27FC236}">
-                <a16:creationId xmlns:a16="http://schemas.microsoft.com/office/drawing/2014/main" xmlns="" id="{66E292ED-32C0-4040-B756-620EE08BB473}"/>
+                <a16:creationId xmlns="" xmlns:a16="http://schemas.microsoft.com/office/drawing/2014/main" id="{66E292ED-32C0-4040-B756-620EE08BB473}"/>
               </a:ext>
             </a:extLst>
           </p:cNvPr>
@@ -6571,11 +6571,11 @@
   <p:clrMapOvr>
     <a:masterClrMapping/>
   </p:clrMapOvr>
-  <mc:AlternateContent xmlns:mc="http://schemas.openxmlformats.org/markup-compatibility/2006">
-    <mc:Choice xmlns:p14="http://schemas.microsoft.com/office/powerpoint/2010/main" Requires="p14">
+  <mc:AlternateContent xmlns:mc="http://schemas.openxmlformats.org/markup-compatibility/2006" xmlns:p14="http://schemas.microsoft.com/office/powerpoint/2010/main">
+    <mc:Choice Requires="p14">
       <p:transition spd="slow" p14:dur="2000"/>
     </mc:Choice>
-    <mc:Fallback>
+    <mc:Fallback xmlns="">
       <p:transition spd="slow"/>
     </mc:Fallback>
   </mc:AlternateContent>
@@ -6678,7 +6678,7 @@
           <p:cNvPr id="7" name="CuadroTexto 6">
             <a:extLst>
               <a:ext uri="{FF2B5EF4-FFF2-40B4-BE49-F238E27FC236}">
-                <a16:creationId xmlns:a16="http://schemas.microsoft.com/office/drawing/2014/main" xmlns="" id="{6615F832-201D-453C-BF18-C60BA216B29C}"/>
+                <a16:creationId xmlns="" xmlns:a16="http://schemas.microsoft.com/office/drawing/2014/main" id="{6615F832-201D-453C-BF18-C60BA216B29C}"/>
               </a:ext>
             </a:extLst>
           </p:cNvPr>
@@ -6704,8 +6704,13 @@
             <a:pPr algn="just"/>
             <a:r>
               <a:rPr lang="es-CL" dirty="0"/>
-              <a:t>NO existe en Chile una plataforma tecnológica que permita poder realizar transferencias online de divisas al extranjero de manera rápida, de bajo costo y al alcance de usuarios.</a:t>
-            </a:r>
+              <a:t>NO existe en Chile una plataforma tecnológica que permita poder realizar transferencias online de divisas al extranjero de manera rápida, de bajo costo y al alcance de </a:t>
+            </a:r>
+            <a:r>
+              <a:rPr lang="es-CL" smtClean="0"/>
+              <a:t>usuarios.a</a:t>
+            </a:r>
+            <a:endParaRPr lang="es-CL" dirty="0"/>
           </a:p>
           <a:p>
             <a:pPr marL="285750" indent="-285750">
@@ -6841,7 +6846,7 @@
           <p:cNvPr id="7" name="CuadroTexto 6">
             <a:extLst>
               <a:ext uri="{FF2B5EF4-FFF2-40B4-BE49-F238E27FC236}">
-                <a16:creationId xmlns:a16="http://schemas.microsoft.com/office/drawing/2014/main" xmlns="" id="{6615F832-201D-453C-BF18-C60BA216B29C}"/>
+                <a16:creationId xmlns="" xmlns:a16="http://schemas.microsoft.com/office/drawing/2014/main" id="{6615F832-201D-453C-BF18-C60BA216B29C}"/>
               </a:ext>
             </a:extLst>
           </p:cNvPr>
@@ -6923,7 +6928,7 @@
           <p:cNvPr id="3" name="Imagen 2">
             <a:extLst>
               <a:ext uri="{FF2B5EF4-FFF2-40B4-BE49-F238E27FC236}">
-                <a16:creationId xmlns:a16="http://schemas.microsoft.com/office/drawing/2014/main" xmlns="" id="{FEAF8415-FE18-488D-8F22-0C9FF7D9B1B8}"/>
+                <a16:creationId xmlns="" xmlns:a16="http://schemas.microsoft.com/office/drawing/2014/main" id="{FEAF8415-FE18-488D-8F22-0C9FF7D9B1B8}"/>
               </a:ext>
             </a:extLst>
           </p:cNvPr>
@@ -6953,7 +6958,7 @@
           <p:cNvPr id="5" name="Imagen 4">
             <a:extLst>
               <a:ext uri="{FF2B5EF4-FFF2-40B4-BE49-F238E27FC236}">
-                <a16:creationId xmlns:a16="http://schemas.microsoft.com/office/drawing/2014/main" xmlns="" id="{50F380BB-66BE-4FB3-93EB-40F7B9EF406F}"/>
+                <a16:creationId xmlns="" xmlns:a16="http://schemas.microsoft.com/office/drawing/2014/main" id="{50F380BB-66BE-4FB3-93EB-40F7B9EF406F}"/>
               </a:ext>
             </a:extLst>
           </p:cNvPr>
@@ -6983,7 +6988,7 @@
           <p:cNvPr id="6" name="Imagen 5">
             <a:extLst>
               <a:ext uri="{FF2B5EF4-FFF2-40B4-BE49-F238E27FC236}">
-                <a16:creationId xmlns:a16="http://schemas.microsoft.com/office/drawing/2014/main" xmlns="" id="{1B5DDBB9-A316-4EC6-B229-EDD8EA155B2F}"/>
+                <a16:creationId xmlns="" xmlns:a16="http://schemas.microsoft.com/office/drawing/2014/main" id="{1B5DDBB9-A316-4EC6-B229-EDD8EA155B2F}"/>
               </a:ext>
             </a:extLst>
           </p:cNvPr>
@@ -7013,7 +7018,7 @@
           <p:cNvPr id="8" name="Imagen 7">
             <a:extLst>
               <a:ext uri="{FF2B5EF4-FFF2-40B4-BE49-F238E27FC236}">
-                <a16:creationId xmlns:a16="http://schemas.microsoft.com/office/drawing/2014/main" xmlns="" id="{71F01B16-03CE-414A-BCC4-56E813882A29}"/>
+                <a16:creationId xmlns="" xmlns:a16="http://schemas.microsoft.com/office/drawing/2014/main" id="{71F01B16-03CE-414A-BCC4-56E813882A29}"/>
               </a:ext>
             </a:extLst>
           </p:cNvPr>
@@ -7154,7 +7159,7 @@
           <p:cNvPr id="5" name="Imagen 4">
             <a:extLst>
               <a:ext uri="{FF2B5EF4-FFF2-40B4-BE49-F238E27FC236}">
-                <a16:creationId xmlns:a16="http://schemas.microsoft.com/office/drawing/2014/main" xmlns="" id="{D46A58EA-ACED-41B7-AECF-A84EC1808920}"/>
+                <a16:creationId xmlns="" xmlns:a16="http://schemas.microsoft.com/office/drawing/2014/main" id="{D46A58EA-ACED-41B7-AECF-A84EC1808920}"/>
               </a:ext>
             </a:extLst>
           </p:cNvPr>
@@ -7184,7 +7189,7 @@
           <p:cNvPr id="3" name="CuadroTexto 2">
             <a:extLst>
               <a:ext uri="{FF2B5EF4-FFF2-40B4-BE49-F238E27FC236}">
-                <a16:creationId xmlns:a16="http://schemas.microsoft.com/office/drawing/2014/main" xmlns="" id="{7763B7E1-3CF0-481B-A5FA-35D2566773E7}"/>
+                <a16:creationId xmlns="" xmlns:a16="http://schemas.microsoft.com/office/drawing/2014/main" id="{7763B7E1-3CF0-481B-A5FA-35D2566773E7}"/>
               </a:ext>
             </a:extLst>
           </p:cNvPr>
@@ -7220,7 +7225,7 @@
           <p:cNvPr id="6" name="Imagen 5">
             <a:extLst>
               <a:ext uri="{FF2B5EF4-FFF2-40B4-BE49-F238E27FC236}">
-                <a16:creationId xmlns:a16="http://schemas.microsoft.com/office/drawing/2014/main" xmlns="" id="{DC38047F-05B6-4E61-9B7F-67A18A94BAB4}"/>
+                <a16:creationId xmlns="" xmlns:a16="http://schemas.microsoft.com/office/drawing/2014/main" id="{DC38047F-05B6-4E61-9B7F-67A18A94BAB4}"/>
               </a:ext>
             </a:extLst>
           </p:cNvPr>
@@ -7250,7 +7255,7 @@
           <p:cNvPr id="8" name="Imagen 7">
             <a:extLst>
               <a:ext uri="{FF2B5EF4-FFF2-40B4-BE49-F238E27FC236}">
-                <a16:creationId xmlns:a16="http://schemas.microsoft.com/office/drawing/2014/main" xmlns="" id="{B8EFA975-4B1C-44C8-86F3-3403B61B809B}"/>
+                <a16:creationId xmlns="" xmlns:a16="http://schemas.microsoft.com/office/drawing/2014/main" id="{B8EFA975-4B1C-44C8-86F3-3403B61B809B}"/>
               </a:ext>
             </a:extLst>
           </p:cNvPr>
@@ -7280,7 +7285,7 @@
           <p:cNvPr id="9" name="Imagen 8">
             <a:extLst>
               <a:ext uri="{FF2B5EF4-FFF2-40B4-BE49-F238E27FC236}">
-                <a16:creationId xmlns:a16="http://schemas.microsoft.com/office/drawing/2014/main" xmlns="" id="{A509142A-A20F-4674-B59D-E5025CA3D772}"/>
+                <a16:creationId xmlns="" xmlns:a16="http://schemas.microsoft.com/office/drawing/2014/main" id="{A509142A-A20F-4674-B59D-E5025CA3D772}"/>
               </a:ext>
             </a:extLst>
           </p:cNvPr>
@@ -7310,7 +7315,7 @@
           <p:cNvPr id="13" name="Conector recto de flecha 12">
             <a:extLst>
               <a:ext uri="{FF2B5EF4-FFF2-40B4-BE49-F238E27FC236}">
-                <a16:creationId xmlns:a16="http://schemas.microsoft.com/office/drawing/2014/main" xmlns="" id="{88D2C3CD-84D6-42F2-94DB-8F8EC3912199}"/>
+                <a16:creationId xmlns="" xmlns:a16="http://schemas.microsoft.com/office/drawing/2014/main" id="{88D2C3CD-84D6-42F2-94DB-8F8EC3912199}"/>
               </a:ext>
             </a:extLst>
           </p:cNvPr>
@@ -7349,7 +7354,7 @@
           <p:cNvPr id="14" name="Conector recto de flecha 13">
             <a:extLst>
               <a:ext uri="{FF2B5EF4-FFF2-40B4-BE49-F238E27FC236}">
-                <a16:creationId xmlns:a16="http://schemas.microsoft.com/office/drawing/2014/main" xmlns="" id="{F6A048D1-4437-4EEF-BDAE-241C7012C677}"/>
+                <a16:creationId xmlns="" xmlns:a16="http://schemas.microsoft.com/office/drawing/2014/main" id="{F6A048D1-4437-4EEF-BDAE-241C7012C677}"/>
               </a:ext>
             </a:extLst>
           </p:cNvPr>
@@ -7390,7 +7395,7 @@
           <p:cNvPr id="20" name="Cubo 19">
             <a:extLst>
               <a:ext uri="{FF2B5EF4-FFF2-40B4-BE49-F238E27FC236}">
-                <a16:creationId xmlns:a16="http://schemas.microsoft.com/office/drawing/2014/main" xmlns="" id="{A71CC159-0A7E-45CC-A833-C6BCCB5678EA}"/>
+                <a16:creationId xmlns="" xmlns:a16="http://schemas.microsoft.com/office/drawing/2014/main" id="{A71CC159-0A7E-45CC-A833-C6BCCB5678EA}"/>
               </a:ext>
             </a:extLst>
           </p:cNvPr>
@@ -7436,7 +7441,7 @@
           <p:cNvPr id="21" name="Cubo 20">
             <a:extLst>
               <a:ext uri="{FF2B5EF4-FFF2-40B4-BE49-F238E27FC236}">
-                <a16:creationId xmlns:a16="http://schemas.microsoft.com/office/drawing/2014/main" xmlns="" id="{7BBCC751-4486-4848-95BD-F80819A03CCF}"/>
+                <a16:creationId xmlns="" xmlns:a16="http://schemas.microsoft.com/office/drawing/2014/main" id="{7BBCC751-4486-4848-95BD-F80819A03CCF}"/>
               </a:ext>
             </a:extLst>
           </p:cNvPr>
@@ -7482,7 +7487,7 @@
           <p:cNvPr id="26" name="Conector recto de flecha 25">
             <a:extLst>
               <a:ext uri="{FF2B5EF4-FFF2-40B4-BE49-F238E27FC236}">
-                <a16:creationId xmlns:a16="http://schemas.microsoft.com/office/drawing/2014/main" xmlns="" id="{422CCB83-C7A7-4008-A6D1-310ABC130C6C}"/>
+                <a16:creationId xmlns="" xmlns:a16="http://schemas.microsoft.com/office/drawing/2014/main" id="{422CCB83-C7A7-4008-A6D1-310ABC130C6C}"/>
               </a:ext>
             </a:extLst>
           </p:cNvPr>
@@ -7525,7 +7530,7 @@
           <p:cNvPr id="32" name="Cubo 31">
             <a:extLst>
               <a:ext uri="{FF2B5EF4-FFF2-40B4-BE49-F238E27FC236}">
-                <a16:creationId xmlns:a16="http://schemas.microsoft.com/office/drawing/2014/main" xmlns="" id="{4786A59F-EFA7-4653-BD26-7C44F6AE96DC}"/>
+                <a16:creationId xmlns="" xmlns:a16="http://schemas.microsoft.com/office/drawing/2014/main" id="{4786A59F-EFA7-4653-BD26-7C44F6AE96DC}"/>
               </a:ext>
             </a:extLst>
           </p:cNvPr>
@@ -7571,7 +7576,7 @@
           <p:cNvPr id="33" name="Cubo 32">
             <a:extLst>
               <a:ext uri="{FF2B5EF4-FFF2-40B4-BE49-F238E27FC236}">
-                <a16:creationId xmlns:a16="http://schemas.microsoft.com/office/drawing/2014/main" xmlns="" id="{1EFF4942-1FF5-4288-B8C0-8EFD53C63688}"/>
+                <a16:creationId xmlns="" xmlns:a16="http://schemas.microsoft.com/office/drawing/2014/main" id="{1EFF4942-1FF5-4288-B8C0-8EFD53C63688}"/>
               </a:ext>
             </a:extLst>
           </p:cNvPr>
@@ -7617,7 +7622,7 @@
           <p:cNvPr id="34" name="Conector recto de flecha 33">
             <a:extLst>
               <a:ext uri="{FF2B5EF4-FFF2-40B4-BE49-F238E27FC236}">
-                <a16:creationId xmlns:a16="http://schemas.microsoft.com/office/drawing/2014/main" xmlns="" id="{F5A6F2FF-D890-4DF8-A00F-B020AC166473}"/>
+                <a16:creationId xmlns="" xmlns:a16="http://schemas.microsoft.com/office/drawing/2014/main" id="{F5A6F2FF-D890-4DF8-A00F-B020AC166473}"/>
               </a:ext>
             </a:extLst>
           </p:cNvPr>
@@ -7660,7 +7665,7 @@
           <p:cNvPr id="35" name="Conector recto de flecha 34">
             <a:extLst>
               <a:ext uri="{FF2B5EF4-FFF2-40B4-BE49-F238E27FC236}">
-                <a16:creationId xmlns:a16="http://schemas.microsoft.com/office/drawing/2014/main" xmlns="" id="{0079336B-043B-4922-8C34-51CDFC3B53EA}"/>
+                <a16:creationId xmlns="" xmlns:a16="http://schemas.microsoft.com/office/drawing/2014/main" id="{0079336B-043B-4922-8C34-51CDFC3B53EA}"/>
               </a:ext>
             </a:extLst>
           </p:cNvPr>
@@ -7701,7 +7706,7 @@
           <p:cNvPr id="36" name="Cubo 35">
             <a:extLst>
               <a:ext uri="{FF2B5EF4-FFF2-40B4-BE49-F238E27FC236}">
-                <a16:creationId xmlns:a16="http://schemas.microsoft.com/office/drawing/2014/main" xmlns="" id="{8FFD8FF4-D0A1-4A3A-8899-EA37940D7456}"/>
+                <a16:creationId xmlns="" xmlns:a16="http://schemas.microsoft.com/office/drawing/2014/main" id="{8FFD8FF4-D0A1-4A3A-8899-EA37940D7456}"/>
               </a:ext>
             </a:extLst>
           </p:cNvPr>
@@ -7747,7 +7752,7 @@
           <p:cNvPr id="37" name="Cubo 36">
             <a:extLst>
               <a:ext uri="{FF2B5EF4-FFF2-40B4-BE49-F238E27FC236}">
-                <a16:creationId xmlns:a16="http://schemas.microsoft.com/office/drawing/2014/main" xmlns="" id="{78EE5468-3D30-4F62-8578-A7D9456DDF42}"/>
+                <a16:creationId xmlns="" xmlns:a16="http://schemas.microsoft.com/office/drawing/2014/main" id="{78EE5468-3D30-4F62-8578-A7D9456DDF42}"/>
               </a:ext>
             </a:extLst>
           </p:cNvPr>
@@ -7793,7 +7798,7 @@
           <p:cNvPr id="38" name="Conector recto de flecha 37">
             <a:extLst>
               <a:ext uri="{FF2B5EF4-FFF2-40B4-BE49-F238E27FC236}">
-                <a16:creationId xmlns:a16="http://schemas.microsoft.com/office/drawing/2014/main" xmlns="" id="{91F5DD6D-5C57-4A2C-BCB6-95BDF13B2DE3}"/>
+                <a16:creationId xmlns="" xmlns:a16="http://schemas.microsoft.com/office/drawing/2014/main" id="{91F5DD6D-5C57-4A2C-BCB6-95BDF13B2DE3}"/>
               </a:ext>
             </a:extLst>
           </p:cNvPr>
@@ -7836,7 +7841,7 @@
           <p:cNvPr id="39" name="Conector recto de flecha 38">
             <a:extLst>
               <a:ext uri="{FF2B5EF4-FFF2-40B4-BE49-F238E27FC236}">
-                <a16:creationId xmlns:a16="http://schemas.microsoft.com/office/drawing/2014/main" xmlns="" id="{ACDAAB91-A6E7-43B3-B46A-A3E111E211A3}"/>
+                <a16:creationId xmlns="" xmlns:a16="http://schemas.microsoft.com/office/drawing/2014/main" id="{ACDAAB91-A6E7-43B3-B46A-A3E111E211A3}"/>
               </a:ext>
             </a:extLst>
           </p:cNvPr>
@@ -7988,7 +7993,7 @@
           <p:cNvPr id="3" name="CuadroTexto 2">
             <a:extLst>
               <a:ext uri="{FF2B5EF4-FFF2-40B4-BE49-F238E27FC236}">
-                <a16:creationId xmlns:a16="http://schemas.microsoft.com/office/drawing/2014/main" xmlns="" id="{7763B7E1-3CF0-481B-A5FA-35D2566773E7}"/>
+                <a16:creationId xmlns="" xmlns:a16="http://schemas.microsoft.com/office/drawing/2014/main" id="{7763B7E1-3CF0-481B-A5FA-35D2566773E7}"/>
               </a:ext>
             </a:extLst>
           </p:cNvPr>
@@ -8255,7 +8260,7 @@
           <p:cNvPr id="3" name="Imagen 2">
             <a:extLst>
               <a:ext uri="{FF2B5EF4-FFF2-40B4-BE49-F238E27FC236}">
-                <a16:creationId xmlns:a16="http://schemas.microsoft.com/office/drawing/2014/main" xmlns="" id="{3D6F0089-AF71-45DF-A665-BA80EB074C3A}"/>
+                <a16:creationId xmlns="" xmlns:a16="http://schemas.microsoft.com/office/drawing/2014/main" id="{3D6F0089-AF71-45DF-A665-BA80EB074C3A}"/>
               </a:ext>
             </a:extLst>
           </p:cNvPr>
@@ -8396,7 +8401,7 @@
           <p:cNvPr id="7" name="CuadroTexto 6">
             <a:extLst>
               <a:ext uri="{FF2B5EF4-FFF2-40B4-BE49-F238E27FC236}">
-                <a16:creationId xmlns:a16="http://schemas.microsoft.com/office/drawing/2014/main" xmlns="" id="{6615F832-201D-453C-BF18-C60BA216B29C}"/>
+                <a16:creationId xmlns="" xmlns:a16="http://schemas.microsoft.com/office/drawing/2014/main" id="{6615F832-201D-453C-BF18-C60BA216B29C}"/>
               </a:ext>
             </a:extLst>
           </p:cNvPr>
@@ -8509,7 +8514,7 @@
           <p:cNvPr id="3" name="Imagen 2">
             <a:extLst>
               <a:ext uri="{FF2B5EF4-FFF2-40B4-BE49-F238E27FC236}">
-                <a16:creationId xmlns:a16="http://schemas.microsoft.com/office/drawing/2014/main" xmlns="" id="{3BD5A31D-47FA-4451-809C-3B1674D61BA7}"/>
+                <a16:creationId xmlns="" xmlns:a16="http://schemas.microsoft.com/office/drawing/2014/main" id="{3BD5A31D-47FA-4451-809C-3B1674D61BA7}"/>
               </a:ext>
             </a:extLst>
           </p:cNvPr>
@@ -8539,7 +8544,7 @@
           <p:cNvPr id="5" name="Imagen 4">
             <a:extLst>
               <a:ext uri="{FF2B5EF4-FFF2-40B4-BE49-F238E27FC236}">
-                <a16:creationId xmlns:a16="http://schemas.microsoft.com/office/drawing/2014/main" xmlns="" id="{D1CDA121-52CF-4466-9596-D5F81A96F7AC}"/>
+                <a16:creationId xmlns="" xmlns:a16="http://schemas.microsoft.com/office/drawing/2014/main" id="{D1CDA121-52CF-4466-9596-D5F81A96F7AC}"/>
               </a:ext>
             </a:extLst>
           </p:cNvPr>
@@ -8680,7 +8685,7 @@
           <p:cNvPr id="7" name="CuadroTexto 6">
             <a:extLst>
               <a:ext uri="{FF2B5EF4-FFF2-40B4-BE49-F238E27FC236}">
-                <a16:creationId xmlns:a16="http://schemas.microsoft.com/office/drawing/2014/main" xmlns="" id="{6615F832-201D-453C-BF18-C60BA216B29C}"/>
+                <a16:creationId xmlns="" xmlns:a16="http://schemas.microsoft.com/office/drawing/2014/main" id="{6615F832-201D-453C-BF18-C60BA216B29C}"/>
               </a:ext>
             </a:extLst>
           </p:cNvPr>
@@ -8910,7 +8915,7 @@
           <p:cNvPr id="7" name="CuadroTexto 6">
             <a:extLst>
               <a:ext uri="{FF2B5EF4-FFF2-40B4-BE49-F238E27FC236}">
-                <a16:creationId xmlns:a16="http://schemas.microsoft.com/office/drawing/2014/main" xmlns="" id="{6615F832-201D-453C-BF18-C60BA216B29C}"/>
+                <a16:creationId xmlns="" xmlns:a16="http://schemas.microsoft.com/office/drawing/2014/main" id="{6615F832-201D-453C-BF18-C60BA216B29C}"/>
               </a:ext>
             </a:extLst>
           </p:cNvPr>
@@ -8952,7 +8957,7 @@
           <p:cNvPr id="5" name="Imagen 4">
             <a:extLst>
               <a:ext uri="{FF2B5EF4-FFF2-40B4-BE49-F238E27FC236}">
-                <a16:creationId xmlns:a16="http://schemas.microsoft.com/office/drawing/2014/main" xmlns="" id="{3AD31AA2-D98B-44D8-A245-EDBF3E01C158}"/>
+                <a16:creationId xmlns="" xmlns:a16="http://schemas.microsoft.com/office/drawing/2014/main" id="{3AD31AA2-D98B-44D8-A245-EDBF3E01C158}"/>
               </a:ext>
             </a:extLst>
           </p:cNvPr>

</xml_diff>